<commit_message>
Add replace files for EEGLAB 2019.0
</commit_message>
<xml_diff>
--- a/2018-09-10 CUDAICA on Windows.pptx
+++ b/2018-09-10 CUDAICA on Windows.pptx
@@ -215,7 +215,7 @@
           <a:p>
             <a:fld id="{5EC58298-681B-4A67-8C98-8411F9798EC7}" type="datetimeFigureOut">
               <a:rPr lang="en-US" smtClean="0"/>
-              <a:t>5/25/2019</a:t>
+              <a:t>10/26/2019</a:t>
             </a:fld>
             <a:endParaRPr lang="en-US"/>
           </a:p>
@@ -883,7 +883,7 @@
           <a:p>
             <a:fld id="{78D27FDD-E711-4123-BD3F-B717B9915F98}" type="datetimeFigureOut">
               <a:rPr lang="en-US" smtClean="0"/>
-              <a:t>5/25/2019</a:t>
+              <a:t>10/26/2019</a:t>
             </a:fld>
             <a:endParaRPr lang="en-US"/>
           </a:p>
@@ -1051,7 +1051,7 @@
           <a:p>
             <a:fld id="{78D27FDD-E711-4123-BD3F-B717B9915F98}" type="datetimeFigureOut">
               <a:rPr lang="en-US" smtClean="0"/>
-              <a:t>5/25/2019</a:t>
+              <a:t>10/26/2019</a:t>
             </a:fld>
             <a:endParaRPr lang="en-US"/>
           </a:p>
@@ -1229,7 +1229,7 @@
           <a:p>
             <a:fld id="{78D27FDD-E711-4123-BD3F-B717B9915F98}" type="datetimeFigureOut">
               <a:rPr lang="en-US" smtClean="0"/>
-              <a:t>5/25/2019</a:t>
+              <a:t>10/26/2019</a:t>
             </a:fld>
             <a:endParaRPr lang="en-US"/>
           </a:p>
@@ -1464,7 +1464,7 @@
           <a:p>
             <a:fld id="{78D27FDD-E711-4123-BD3F-B717B9915F98}" type="datetimeFigureOut">
               <a:rPr lang="en-US" smtClean="0"/>
-              <a:t>5/25/2019</a:t>
+              <a:t>10/26/2019</a:t>
             </a:fld>
             <a:endParaRPr lang="en-US"/>
           </a:p>
@@ -1709,7 +1709,7 @@
           <a:p>
             <a:fld id="{78D27FDD-E711-4123-BD3F-B717B9915F98}" type="datetimeFigureOut">
               <a:rPr lang="en-US" smtClean="0"/>
-              <a:t>5/25/2019</a:t>
+              <a:t>10/26/2019</a:t>
             </a:fld>
             <a:endParaRPr lang="en-US"/>
           </a:p>
@@ -1938,7 +1938,7 @@
           <a:p>
             <a:fld id="{78D27FDD-E711-4123-BD3F-B717B9915F98}" type="datetimeFigureOut">
               <a:rPr lang="en-US" smtClean="0"/>
-              <a:t>5/25/2019</a:t>
+              <a:t>10/26/2019</a:t>
             </a:fld>
             <a:endParaRPr lang="en-US"/>
           </a:p>
@@ -2302,7 +2302,7 @@
           <a:p>
             <a:fld id="{78D27FDD-E711-4123-BD3F-B717B9915F98}" type="datetimeFigureOut">
               <a:rPr lang="en-US" smtClean="0"/>
-              <a:t>5/25/2019</a:t>
+              <a:t>10/26/2019</a:t>
             </a:fld>
             <a:endParaRPr lang="en-US"/>
           </a:p>
@@ -2419,7 +2419,7 @@
           <a:p>
             <a:fld id="{78D27FDD-E711-4123-BD3F-B717B9915F98}" type="datetimeFigureOut">
               <a:rPr lang="en-US" smtClean="0"/>
-              <a:t>5/25/2019</a:t>
+              <a:t>10/26/2019</a:t>
             </a:fld>
             <a:endParaRPr lang="en-US"/>
           </a:p>
@@ -2514,7 +2514,7 @@
           <a:p>
             <a:fld id="{78D27FDD-E711-4123-BD3F-B717B9915F98}" type="datetimeFigureOut">
               <a:rPr lang="en-US" smtClean="0"/>
-              <a:t>5/25/2019</a:t>
+              <a:t>10/26/2019</a:t>
             </a:fld>
             <a:endParaRPr lang="en-US"/>
           </a:p>
@@ -2789,7 +2789,7 @@
           <a:p>
             <a:fld id="{78D27FDD-E711-4123-BD3F-B717B9915F98}" type="datetimeFigureOut">
               <a:rPr lang="en-US" smtClean="0"/>
-              <a:t>5/25/2019</a:t>
+              <a:t>10/26/2019</a:t>
             </a:fld>
             <a:endParaRPr lang="en-US"/>
           </a:p>
@@ -3041,7 +3041,7 @@
           <a:p>
             <a:fld id="{78D27FDD-E711-4123-BD3F-B717B9915F98}" type="datetimeFigureOut">
               <a:rPr lang="en-US" smtClean="0"/>
-              <a:t>5/25/2019</a:t>
+              <a:t>10/26/2019</a:t>
             </a:fld>
             <a:endParaRPr lang="en-US"/>
           </a:p>
@@ -3252,7 +3252,7 @@
           <a:p>
             <a:fld id="{78D27FDD-E711-4123-BD3F-B717B9915F98}" type="datetimeFigureOut">
               <a:rPr lang="en-US" smtClean="0"/>
-              <a:t>5/25/2019</a:t>
+              <a:t>10/26/2019</a:t>
             </a:fld>
             <a:endParaRPr lang="en-US"/>
           </a:p>
@@ -3708,7 +3708,7 @@
           <a:p>
             <a:r>
               <a:rPr lang="en-US" altLang="zh-CN" dirty="0"/>
-              <a:t>Yunhui Zhou</a:t>
+              <a:t>Cognitive and Computational Neuroscience Lab</a:t>
             </a:r>
           </a:p>
           <a:p>

</xml_diff>

<commit_message>
Add support for the new Intel oneAPI base toolkit.
</commit_message>
<xml_diff>
--- a/2018-09-10 CUDAICA on Windows.pptx
+++ b/2018-09-10 CUDAICA on Windows.pptx
@@ -215,7 +215,7 @@
           <a:p>
             <a:fld id="{5EC58298-681B-4A67-8C98-8411F9798EC7}" type="datetimeFigureOut">
               <a:rPr lang="en-US" smtClean="0"/>
-              <a:t>10/26/2019</a:t>
+              <a:t>4/23/2022</a:t>
             </a:fld>
             <a:endParaRPr lang="en-US"/>
           </a:p>
@@ -883,7 +883,7 @@
           <a:p>
             <a:fld id="{78D27FDD-E711-4123-BD3F-B717B9915F98}" type="datetimeFigureOut">
               <a:rPr lang="en-US" smtClean="0"/>
-              <a:t>10/26/2019</a:t>
+              <a:t>4/23/2022</a:t>
             </a:fld>
             <a:endParaRPr lang="en-US"/>
           </a:p>
@@ -1051,7 +1051,7 @@
           <a:p>
             <a:fld id="{78D27FDD-E711-4123-BD3F-B717B9915F98}" type="datetimeFigureOut">
               <a:rPr lang="en-US" smtClean="0"/>
-              <a:t>10/26/2019</a:t>
+              <a:t>4/23/2022</a:t>
             </a:fld>
             <a:endParaRPr lang="en-US"/>
           </a:p>
@@ -1229,7 +1229,7 @@
           <a:p>
             <a:fld id="{78D27FDD-E711-4123-BD3F-B717B9915F98}" type="datetimeFigureOut">
               <a:rPr lang="en-US" smtClean="0"/>
-              <a:t>10/26/2019</a:t>
+              <a:t>4/23/2022</a:t>
             </a:fld>
             <a:endParaRPr lang="en-US"/>
           </a:p>
@@ -1464,7 +1464,7 @@
           <a:p>
             <a:fld id="{78D27FDD-E711-4123-BD3F-B717B9915F98}" type="datetimeFigureOut">
               <a:rPr lang="en-US" smtClean="0"/>
-              <a:t>10/26/2019</a:t>
+              <a:t>4/23/2022</a:t>
             </a:fld>
             <a:endParaRPr lang="en-US"/>
           </a:p>
@@ -1709,7 +1709,7 @@
           <a:p>
             <a:fld id="{78D27FDD-E711-4123-BD3F-B717B9915F98}" type="datetimeFigureOut">
               <a:rPr lang="en-US" smtClean="0"/>
-              <a:t>10/26/2019</a:t>
+              <a:t>4/23/2022</a:t>
             </a:fld>
             <a:endParaRPr lang="en-US"/>
           </a:p>
@@ -1938,7 +1938,7 @@
           <a:p>
             <a:fld id="{78D27FDD-E711-4123-BD3F-B717B9915F98}" type="datetimeFigureOut">
               <a:rPr lang="en-US" smtClean="0"/>
-              <a:t>10/26/2019</a:t>
+              <a:t>4/23/2022</a:t>
             </a:fld>
             <a:endParaRPr lang="en-US"/>
           </a:p>
@@ -2302,7 +2302,7 @@
           <a:p>
             <a:fld id="{78D27FDD-E711-4123-BD3F-B717B9915F98}" type="datetimeFigureOut">
               <a:rPr lang="en-US" smtClean="0"/>
-              <a:t>10/26/2019</a:t>
+              <a:t>4/23/2022</a:t>
             </a:fld>
             <a:endParaRPr lang="en-US"/>
           </a:p>
@@ -2419,7 +2419,7 @@
           <a:p>
             <a:fld id="{78D27FDD-E711-4123-BD3F-B717B9915F98}" type="datetimeFigureOut">
               <a:rPr lang="en-US" smtClean="0"/>
-              <a:t>10/26/2019</a:t>
+              <a:t>4/23/2022</a:t>
             </a:fld>
             <a:endParaRPr lang="en-US"/>
           </a:p>
@@ -2514,7 +2514,7 @@
           <a:p>
             <a:fld id="{78D27FDD-E711-4123-BD3F-B717B9915F98}" type="datetimeFigureOut">
               <a:rPr lang="en-US" smtClean="0"/>
-              <a:t>10/26/2019</a:t>
+              <a:t>4/23/2022</a:t>
             </a:fld>
             <a:endParaRPr lang="en-US"/>
           </a:p>
@@ -2789,7 +2789,7 @@
           <a:p>
             <a:fld id="{78D27FDD-E711-4123-BD3F-B717B9915F98}" type="datetimeFigureOut">
               <a:rPr lang="en-US" smtClean="0"/>
-              <a:t>10/26/2019</a:t>
+              <a:t>4/23/2022</a:t>
             </a:fld>
             <a:endParaRPr lang="en-US"/>
           </a:p>
@@ -3041,7 +3041,7 @@
           <a:p>
             <a:fld id="{78D27FDD-E711-4123-BD3F-B717B9915F98}" type="datetimeFigureOut">
               <a:rPr lang="en-US" smtClean="0"/>
-              <a:t>10/26/2019</a:t>
+              <a:t>4/23/2022</a:t>
             </a:fld>
             <a:endParaRPr lang="en-US"/>
           </a:p>
@@ -3252,7 +3252,7 @@
           <a:p>
             <a:fld id="{78D27FDD-E711-4123-BD3F-B717B9915F98}" type="datetimeFigureOut">
               <a:rPr lang="en-US" smtClean="0"/>
-              <a:t>10/26/2019</a:t>
+              <a:t>4/23/2022</a:t>
             </a:fld>
             <a:endParaRPr lang="en-US"/>
           </a:p>
@@ -4791,7 +4791,7 @@
               <a:rPr lang="en-US" sz="1800" dirty="0">
                 <a:hlinkClick r:id="rId3"/>
               </a:rPr>
-              <a:t>https://github.com/yhz-1995/cudaica_win</a:t>
+              <a:t>https://github.com/CloudyDory/cudaica_win</a:t>
             </a:r>
             <a:endParaRPr lang="en-US" sz="1800" dirty="0"/>
           </a:p>

</xml_diff>